<commit_message>
fixing parse 2 inputs and adding another ppt
</commit_message>
<xml_diff>
--- a/code/results/how using dither impacts the MSE.pptx
+++ b/code/results/how using dither impacts the MSE.pptx
@@ -7,10 +7,10 @@
   <p:sldIdLst>
     <p:sldId id="256" r:id="rId2"/>
     <p:sldId id="261" r:id="rId3"/>
-    <p:sldId id="259" r:id="rId4"/>
-    <p:sldId id="257" r:id="rId5"/>
-    <p:sldId id="258" r:id="rId6"/>
-    <p:sldId id="260" r:id="rId7"/>
+    <p:sldId id="257" r:id="rId4"/>
+    <p:sldId id="258" r:id="rId5"/>
+    <p:sldId id="260" r:id="rId6"/>
+    <p:sldId id="259" r:id="rId7"/>
     <p:sldId id="262" r:id="rId8"/>
   </p:sldIdLst>
   <p:sldSz cx="12192000" cy="6858000"/>
@@ -249,7 +249,7 @@
           <a:p>
             <a:fld id="{331E0C9C-24F9-41A0-90D8-7D03955B5807}" type="datetimeFigureOut">
               <a:rPr lang="en-US" smtClean="0"/>
-              <a:t>2017-02-03</a:t>
+              <a:t>2017-02-07</a:t>
             </a:fld>
             <a:endParaRPr lang="en-US"/>
           </a:p>
@@ -419,7 +419,7 @@
           <a:p>
             <a:fld id="{331E0C9C-24F9-41A0-90D8-7D03955B5807}" type="datetimeFigureOut">
               <a:rPr lang="en-US" smtClean="0"/>
-              <a:t>2017-02-03</a:t>
+              <a:t>2017-02-07</a:t>
             </a:fld>
             <a:endParaRPr lang="en-US"/>
           </a:p>
@@ -599,7 +599,7 @@
           <a:p>
             <a:fld id="{331E0C9C-24F9-41A0-90D8-7D03955B5807}" type="datetimeFigureOut">
               <a:rPr lang="en-US" smtClean="0"/>
-              <a:t>2017-02-03</a:t>
+              <a:t>2017-02-07</a:t>
             </a:fld>
             <a:endParaRPr lang="en-US"/>
           </a:p>
@@ -769,7 +769,7 @@
           <a:p>
             <a:fld id="{331E0C9C-24F9-41A0-90D8-7D03955B5807}" type="datetimeFigureOut">
               <a:rPr lang="en-US" smtClean="0"/>
-              <a:t>2017-02-03</a:t>
+              <a:t>2017-02-07</a:t>
             </a:fld>
             <a:endParaRPr lang="en-US"/>
           </a:p>
@@ -1015,7 +1015,7 @@
           <a:p>
             <a:fld id="{331E0C9C-24F9-41A0-90D8-7D03955B5807}" type="datetimeFigureOut">
               <a:rPr lang="en-US" smtClean="0"/>
-              <a:t>2017-02-03</a:t>
+              <a:t>2017-02-07</a:t>
             </a:fld>
             <a:endParaRPr lang="en-US"/>
           </a:p>
@@ -1247,7 +1247,7 @@
           <a:p>
             <a:fld id="{331E0C9C-24F9-41A0-90D8-7D03955B5807}" type="datetimeFigureOut">
               <a:rPr lang="en-US" smtClean="0"/>
-              <a:t>2017-02-03</a:t>
+              <a:t>2017-02-07</a:t>
             </a:fld>
             <a:endParaRPr lang="en-US"/>
           </a:p>
@@ -1614,7 +1614,7 @@
           <a:p>
             <a:fld id="{331E0C9C-24F9-41A0-90D8-7D03955B5807}" type="datetimeFigureOut">
               <a:rPr lang="en-US" smtClean="0"/>
-              <a:t>2017-02-03</a:t>
+              <a:t>2017-02-07</a:t>
             </a:fld>
             <a:endParaRPr lang="en-US"/>
           </a:p>
@@ -1732,7 +1732,7 @@
           <a:p>
             <a:fld id="{331E0C9C-24F9-41A0-90D8-7D03955B5807}" type="datetimeFigureOut">
               <a:rPr lang="en-US" smtClean="0"/>
-              <a:t>2017-02-03</a:t>
+              <a:t>2017-02-07</a:t>
             </a:fld>
             <a:endParaRPr lang="en-US"/>
           </a:p>
@@ -1827,7 +1827,7 @@
           <a:p>
             <a:fld id="{331E0C9C-24F9-41A0-90D8-7D03955B5807}" type="datetimeFigureOut">
               <a:rPr lang="en-US" smtClean="0"/>
-              <a:t>2017-02-03</a:t>
+              <a:t>2017-02-07</a:t>
             </a:fld>
             <a:endParaRPr lang="en-US"/>
           </a:p>
@@ -2104,7 +2104,7 @@
           <a:p>
             <a:fld id="{331E0C9C-24F9-41A0-90D8-7D03955B5807}" type="datetimeFigureOut">
               <a:rPr lang="en-US" smtClean="0"/>
-              <a:t>2017-02-03</a:t>
+              <a:t>2017-02-07</a:t>
             </a:fld>
             <a:endParaRPr lang="en-US"/>
           </a:p>
@@ -2357,7 +2357,7 @@
           <a:p>
             <a:fld id="{331E0C9C-24F9-41A0-90D8-7D03955B5807}" type="datetimeFigureOut">
               <a:rPr lang="en-US" smtClean="0"/>
-              <a:t>2017-02-03</a:t>
+              <a:t>2017-02-07</a:t>
             </a:fld>
             <a:endParaRPr lang="en-US"/>
           </a:p>
@@ -2570,7 +2570,7 @@
           <a:p>
             <a:fld id="{331E0C9C-24F9-41A0-90D8-7D03955B5807}" type="datetimeFigureOut">
               <a:rPr lang="en-US" smtClean="0"/>
-              <a:t>2017-02-03</a:t>
+              <a:t>2017-02-07</a:t>
             </a:fld>
             <a:endParaRPr lang="en-US"/>
           </a:p>
@@ -2992,7 +2992,15 @@
           <a:p>
             <a:r>
               <a:rPr lang="en-US" dirty="0" smtClean="0"/>
-              <a:t>how using dither reflects on the MSE</a:t>
+              <a:t>how using dither </a:t>
+            </a:r>
+            <a:r>
+              <a:rPr lang="en-US" dirty="0" smtClean="0"/>
+              <a:t>impacts the </a:t>
+            </a:r>
+            <a:r>
+              <a:rPr lang="en-US" dirty="0" smtClean="0"/>
+              <a:t>MSE</a:t>
             </a:r>
             <a:endParaRPr lang="en-US" dirty="0"/>
           </a:p>
@@ -3068,7 +3076,15 @@
           <a:p>
             <a:r>
               <a:rPr lang="en-US" dirty="0" smtClean="0"/>
-              <a:t>we have given quantizers and we want to check if adding uniform </a:t>
+              <a:t>we have </a:t>
+            </a:r>
+            <a:r>
+              <a:rPr lang="en-US" dirty="0" smtClean="0"/>
+              <a:t>a given </a:t>
+            </a:r>
+            <a:r>
+              <a:rPr lang="en-US" dirty="0" smtClean="0"/>
+              <a:t>quantizers and we want to check if adding uniform </a:t>
             </a:r>
             <a:r>
               <a:rPr lang="en-US" dirty="0" err="1" smtClean="0"/>
@@ -3076,8 +3092,13 @@
             </a:r>
             <a:r>
               <a:rPr lang="en-US" dirty="0" smtClean="0"/>
-              <a:t>, quantize and then subtracted the uniform will give better performance than just quantizing</a:t>
-            </a:r>
+              <a:t>, quantize and then subtracted the uniform will give better performance than </a:t>
+            </a:r>
+            <a:r>
+              <a:rPr lang="en-US" dirty="0" smtClean="0"/>
+              <a:t>only quantizing without dither.</a:t>
+            </a:r>
+            <a:endParaRPr lang="en-US" dirty="0" smtClean="0"/>
           </a:p>
           <a:p>
             <a:r>
@@ -3107,7 +3128,7 @@
               <a:t>, with no connection of what it was on the data </a:t>
             </a:r>
             <a:r>
-              <a:rPr lang="en-US" smtClean="0"/>
+              <a:rPr lang="en-US" dirty="0" err="1" smtClean="0"/>
               <a:t>dist</a:t>
             </a:r>
             <a:endParaRPr lang="en-US" dirty="0"/>
@@ -3144,6 +3165,32 @@
           <a:chExt cx="0" cy="0"/>
         </a:xfrm>
       </p:grpSpPr>
+      <p:pic>
+        <p:nvPicPr>
+          <p:cNvPr id="8" name="Content Placeholder 7"/>
+          <p:cNvPicPr>
+            <a:picLocks noGrp="1" noChangeAspect="1"/>
+          </p:cNvPicPr>
+          <p:nvPr>
+            <p:ph idx="1"/>
+          </p:nvPr>
+        </p:nvPicPr>
+        <p:blipFill>
+          <a:blip r:embed="rId2"/>
+          <a:stretch>
+            <a:fillRect/>
+          </a:stretch>
+        </p:blipFill>
+        <p:spPr>
+          <a:xfrm>
+            <a:off x="164361" y="290945"/>
+            <a:ext cx="11893004" cy="6439406"/>
+          </a:xfrm>
+          <a:prstGeom prst="rect">
+            <a:avLst/>
+          </a:prstGeom>
+        </p:spPr>
+      </p:pic>
       <p:sp>
         <p:nvSpPr>
           <p:cNvPr id="2" name="Title 1"/>
@@ -3161,377 +3208,272 @@
           <a:p>
             <a:r>
               <a:rPr lang="en-US" dirty="0" smtClean="0"/>
-              <a:t>best bin sizes per number of quantizer for data var = 1 (with modulo)</a:t>
+              <a:t>bin size = 3 (without modulo)</a:t>
             </a:r>
             <a:endParaRPr lang="en-US" dirty="0"/>
           </a:p>
         </p:txBody>
       </p:sp>
-      <p:sp>
-        <p:nvSpPr>
-          <p:cNvPr id="3" name="Content Placeholder 2"/>
-          <p:cNvSpPr>
-            <a:spLocks noGrp="1"/>
-          </p:cNvSpPr>
-          <p:nvPr>
-            <p:ph idx="1"/>
-          </p:nvPr>
-        </p:nvSpPr>
-        <p:spPr/>
-        <p:txBody>
-          <a:bodyPr numCol="3">
-            <a:noAutofit/>
+      <p:pic>
+        <p:nvPicPr>
+          <p:cNvPr id="5" name="Picture 4"/>
+          <p:cNvPicPr>
+            <a:picLocks noChangeAspect="1"/>
+          </p:cNvPicPr>
+          <p:nvPr/>
+        </p:nvPicPr>
+        <p:blipFill>
+          <a:blip r:embed="rId3"/>
+          <a:stretch>
+            <a:fillRect/>
+          </a:stretch>
+        </p:blipFill>
+        <p:spPr>
+          <a:xfrm>
+            <a:off x="5756564" y="4554682"/>
+            <a:ext cx="1146896" cy="1146896"/>
+          </a:xfrm>
+          <a:prstGeom prst="rect">
+            <a:avLst/>
+          </a:prstGeom>
+        </p:spPr>
+      </p:pic>
+      <p:sp>
+        <p:nvSpPr>
+          <p:cNvPr id="4" name="TextBox 3"/>
+          <p:cNvSpPr txBox="1"/>
+          <p:nvPr/>
+        </p:nvSpPr>
+        <p:spPr>
+          <a:xfrm>
+            <a:off x="5722799" y="1490370"/>
+            <a:ext cx="5468865" cy="369332"/>
+          </a:xfrm>
+          <a:prstGeom prst="rect">
+            <a:avLst/>
+          </a:prstGeom>
+          <a:noFill/>
+        </p:spPr>
+        <p:txBody>
+          <a:bodyPr wrap="square" rtlCol="0">
+            <a:spAutoFit/>
           </a:bodyPr>
           <a:lstStyle/>
           <a:p>
-            <a:pPr marL="0" indent="0">
-              <a:buNone/>
-            </a:pPr>
-            <a:r>
-              <a:rPr lang="en-US" sz="1800" dirty="0" smtClean="0"/>
-              <a:t> 3</a:t>
-            </a:r>
-            <a:r>
-              <a:rPr lang="en-US" sz="1800" dirty="0"/>
-              <a:t>: 1.6400000000000015,</a:t>
-            </a:r>
-          </a:p>
-          <a:p>
-            <a:pPr marL="0" indent="0">
-              <a:buNone/>
-            </a:pPr>
-            <a:r>
-              <a:rPr lang="en-US" sz="1800" dirty="0"/>
-              <a:t> 4: 1.342000000000001,</a:t>
-            </a:r>
-          </a:p>
-          <a:p>
-            <a:pPr marL="0" indent="0">
-              <a:buNone/>
-            </a:pPr>
-            <a:r>
-              <a:rPr lang="en-US" sz="1800" dirty="0"/>
-              <a:t> 5: 1.1866666666666676,</a:t>
-            </a:r>
-          </a:p>
-          <a:p>
-            <a:pPr marL="0" indent="0">
-              <a:buNone/>
-            </a:pPr>
-            <a:r>
-              <a:rPr lang="en-US" sz="1800" dirty="0"/>
-              <a:t> 6: 1.0021428571428579,</a:t>
-            </a:r>
-          </a:p>
-          <a:p>
-            <a:pPr marL="0" indent="0">
-              <a:buNone/>
-            </a:pPr>
-            <a:r>
-              <a:rPr lang="en-US" sz="1800" dirty="0"/>
-              <a:t> 7: 0.91375000000000073,</a:t>
-            </a:r>
-          </a:p>
-          <a:p>
-            <a:pPr marL="0" indent="0">
-              <a:buNone/>
-            </a:pPr>
-            <a:r>
-              <a:rPr lang="en-US" sz="1800" dirty="0"/>
-              <a:t> 8: 0.83888888888888946,</a:t>
-            </a:r>
-          </a:p>
-          <a:p>
-            <a:pPr marL="0" indent="0">
-              <a:buNone/>
-            </a:pPr>
-            <a:r>
-              <a:rPr lang="en-US" sz="1800" dirty="0"/>
-              <a:t> 9: 0.75650000000000084,</a:t>
-            </a:r>
-          </a:p>
-          <a:p>
-            <a:pPr marL="0" indent="0">
-              <a:buNone/>
-            </a:pPr>
-            <a:r>
-              <a:rPr lang="en-US" sz="1800" dirty="0"/>
-              <a:t> 10: 0.66045454545454607,</a:t>
-            </a:r>
-          </a:p>
-          <a:p>
-            <a:pPr marL="0" indent="0">
-              <a:buNone/>
-            </a:pPr>
-            <a:r>
-              <a:rPr lang="en-US" sz="1800" dirty="0"/>
-              <a:t> 11: 0.63333333333333375,</a:t>
-            </a:r>
-          </a:p>
-          <a:p>
-            <a:pPr marL="0" indent="0">
-              <a:buNone/>
-            </a:pPr>
-            <a:r>
-              <a:rPr lang="en-US" sz="1800" dirty="0"/>
-              <a:t> 12: 0.57346153846153891,</a:t>
-            </a:r>
-          </a:p>
-          <a:p>
-            <a:pPr marL="0" indent="0">
-              <a:buNone/>
-            </a:pPr>
-            <a:r>
-              <a:rPr lang="en-US" sz="1800" dirty="0"/>
-              <a:t> 13: 0.53500000000000059,</a:t>
-            </a:r>
-          </a:p>
-          <a:p>
-            <a:pPr marL="0" indent="0">
-              <a:buNone/>
-            </a:pPr>
-            <a:r>
-              <a:rPr lang="en-US" sz="1800" dirty="0"/>
-              <a:t> 14: 0.51066666666666682,</a:t>
-            </a:r>
-          </a:p>
-          <a:p>
-            <a:pPr marL="0" indent="0">
-              <a:buNone/>
-            </a:pPr>
-            <a:r>
-              <a:rPr lang="en-US" sz="1800" dirty="0"/>
-              <a:t> 15: 0.48218750000000021,</a:t>
-            </a:r>
-          </a:p>
-          <a:p>
-            <a:pPr marL="0" indent="0">
-              <a:buNone/>
-            </a:pPr>
-            <a:r>
-              <a:rPr lang="en-US" sz="1800" dirty="0"/>
-              <a:t> 16: 0.4529411764705884,</a:t>
-            </a:r>
-          </a:p>
-          <a:p>
-            <a:pPr marL="0" indent="0">
-              <a:buNone/>
-            </a:pPr>
-            <a:r>
-              <a:rPr lang="en-US" sz="1800" dirty="0"/>
-              <a:t> 17: 0.43416666666666703,</a:t>
-            </a:r>
-          </a:p>
-          <a:p>
-            <a:pPr marL="0" indent="0">
-              <a:buNone/>
-            </a:pPr>
-            <a:r>
-              <a:rPr lang="en-US" sz="1800" dirty="0"/>
-              <a:t> 18: 0.41526315789473722,</a:t>
-            </a:r>
-          </a:p>
-          <a:p>
-            <a:pPr marL="0" indent="0">
-              <a:buNone/>
-            </a:pPr>
-            <a:r>
-              <a:rPr lang="en-US" sz="1800" dirty="0"/>
-              <a:t> 19: 0.38925000000000054,</a:t>
-            </a:r>
-          </a:p>
-          <a:p>
-            <a:pPr marL="0" indent="0">
-              <a:buNone/>
-            </a:pPr>
-            <a:r>
-              <a:rPr lang="en-US" sz="1800" dirty="0"/>
-              <a:t> 20: 0.36142857142857165,</a:t>
-            </a:r>
-          </a:p>
-          <a:p>
-            <a:pPr marL="0" indent="0">
-              <a:buNone/>
-            </a:pPr>
-            <a:r>
-              <a:rPr lang="en-US" sz="1800" dirty="0"/>
-              <a:t> 21: 0.36818181818181861,</a:t>
-            </a:r>
-          </a:p>
-          <a:p>
-            <a:pPr marL="0" indent="0">
-              <a:buNone/>
-            </a:pPr>
-            <a:r>
-              <a:rPr lang="en-US" sz="1800" dirty="0"/>
-              <a:t> 22: 0.34456521739130475,</a:t>
-            </a:r>
-          </a:p>
-          <a:p>
-            <a:pPr marL="0" indent="0">
-              <a:buNone/>
-            </a:pPr>
-            <a:r>
-              <a:rPr lang="en-US" sz="1800" dirty="0"/>
-              <a:t> 23: 0.3266666666666671,</a:t>
-            </a:r>
-          </a:p>
-          <a:p>
-            <a:pPr marL="0" indent="0">
-              <a:buNone/>
-            </a:pPr>
-            <a:r>
-              <a:rPr lang="en-US" sz="1800" dirty="0"/>
-              <a:t> 24: 0.31840000000000046,</a:t>
-            </a:r>
-          </a:p>
-          <a:p>
-            <a:pPr marL="0" indent="0">
-              <a:buNone/>
-            </a:pPr>
-            <a:r>
-              <a:rPr lang="en-US" sz="1800" dirty="0"/>
-              <a:t> 25: 0.30692307692307708,</a:t>
-            </a:r>
-          </a:p>
-          <a:p>
-            <a:pPr marL="0" indent="0">
-              <a:buNone/>
-            </a:pPr>
-            <a:r>
-              <a:rPr lang="en-US" sz="1800" dirty="0"/>
-              <a:t> 26: 0.28555555555555578,</a:t>
-            </a:r>
-          </a:p>
-          <a:p>
-            <a:pPr marL="0" indent="0">
-              <a:buNone/>
-            </a:pPr>
-            <a:r>
-              <a:rPr lang="en-US" sz="1800" dirty="0"/>
-              <a:t> 27: 0.28392857142857153,</a:t>
-            </a:r>
-          </a:p>
-          <a:p>
-            <a:pPr marL="0" indent="0">
-              <a:buNone/>
-            </a:pPr>
-            <a:r>
-              <a:rPr lang="en-US" sz="1800" dirty="0"/>
-              <a:t> 28: 0.27741379310344838,</a:t>
-            </a:r>
-          </a:p>
-          <a:p>
-            <a:pPr marL="0" indent="0">
-              <a:buNone/>
-            </a:pPr>
-            <a:r>
-              <a:rPr lang="en-US" sz="1800" dirty="0"/>
-              <a:t> 29: 0.26583333333333359,</a:t>
-            </a:r>
-          </a:p>
-          <a:p>
-            <a:pPr marL="0" indent="0">
-              <a:buNone/>
-            </a:pPr>
-            <a:r>
-              <a:rPr lang="en-US" sz="1800" dirty="0"/>
-              <a:t> 30: 0.25983870967741973,</a:t>
-            </a:r>
-          </a:p>
-          <a:p>
-            <a:pPr marL="0" indent="0">
-              <a:buNone/>
-            </a:pPr>
-            <a:r>
-              <a:rPr lang="en-US" sz="1800" dirty="0"/>
-              <a:t> 31: 0.24562500000000043,</a:t>
-            </a:r>
-          </a:p>
-          <a:p>
-            <a:pPr marL="0" indent="0">
-              <a:buNone/>
-            </a:pPr>
-            <a:r>
-              <a:rPr lang="en-US" sz="1800" dirty="0"/>
-              <a:t> 32: 0.2360606060606063,</a:t>
-            </a:r>
-          </a:p>
-          <a:p>
-            <a:pPr marL="0" indent="0">
-              <a:buNone/>
-            </a:pPr>
-            <a:r>
-              <a:rPr lang="en-US" sz="1800" dirty="0"/>
-              <a:t> 33: 0.23573529411764715,</a:t>
-            </a:r>
-          </a:p>
-          <a:p>
-            <a:pPr marL="0" indent="0">
-              <a:buNone/>
-            </a:pPr>
-            <a:r>
-              <a:rPr lang="en-US" sz="1800" dirty="0"/>
-              <a:t> 34: 0.21785714285714297,</a:t>
-            </a:r>
-          </a:p>
-          <a:p>
-            <a:pPr marL="0" indent="0">
-              <a:buNone/>
-            </a:pPr>
-            <a:r>
-              <a:rPr lang="en-US" sz="1800" dirty="0"/>
-              <a:t> 35: 0.22208333333333341,</a:t>
-            </a:r>
-          </a:p>
-          <a:p>
-            <a:pPr marL="0" indent="0">
-              <a:buNone/>
-            </a:pPr>
-            <a:r>
-              <a:rPr lang="en-US" sz="1800" dirty="0"/>
-              <a:t> 36: 0.21310810810810832,</a:t>
-            </a:r>
-          </a:p>
-          <a:p>
-            <a:pPr marL="0" indent="0">
-              <a:buNone/>
-            </a:pPr>
-            <a:r>
-              <a:rPr lang="en-US" sz="1800" dirty="0"/>
-              <a:t> 37: 0.21381578947368451,</a:t>
-            </a:r>
-          </a:p>
-          <a:p>
-            <a:pPr marL="0" indent="0">
-              <a:buNone/>
-            </a:pPr>
-            <a:r>
-              <a:rPr lang="en-US" sz="1800" dirty="0"/>
-              <a:t> 38: 0.20243589743589752,</a:t>
-            </a:r>
-          </a:p>
-          <a:p>
-            <a:pPr marL="0" indent="0">
-              <a:buNone/>
-            </a:pPr>
-            <a:r>
-              <a:rPr lang="en-US" sz="1800" dirty="0"/>
-              <a:t> 39: 0.18800000000000017</a:t>
-            </a:r>
-          </a:p>
-          <a:p>
-            <a:pPr marL="0" indent="0">
-              <a:buNone/>
-            </a:pPr>
-            <a:endParaRPr lang="en-US" sz="1800" dirty="0"/>
-          </a:p>
-        </p:txBody>
-      </p:sp>
+            <a:r>
+              <a:rPr lang="en-US" dirty="0" smtClean="0">
+                <a:solidFill>
+                  <a:srgbClr val="FF0000"/>
+                </a:solidFill>
+              </a:rPr>
+              <a:t>ratio between w alpha w dither and wo alpha wo dither</a:t>
+            </a:r>
+            <a:endParaRPr lang="en-US" dirty="0">
+              <a:solidFill>
+                <a:srgbClr val="FF0000"/>
+              </a:solidFill>
+            </a:endParaRPr>
+          </a:p>
+        </p:txBody>
+      </p:sp>
+      <p:sp>
+        <p:nvSpPr>
+          <p:cNvPr id="7" name="Rectangle 6"/>
+          <p:cNvSpPr/>
+          <p:nvPr/>
+        </p:nvSpPr>
+        <p:spPr>
+          <a:xfrm>
+            <a:off x="5785953" y="3479681"/>
+            <a:ext cx="5405711" cy="369332"/>
+          </a:xfrm>
+          <a:prstGeom prst="rect">
+            <a:avLst/>
+          </a:prstGeom>
+        </p:spPr>
+        <p:txBody>
+          <a:bodyPr wrap="none">
+            <a:spAutoFit/>
+          </a:bodyPr>
+          <a:lstStyle/>
+          <a:p>
+            <a:r>
+              <a:rPr lang="en-US" dirty="0">
+                <a:solidFill>
+                  <a:srgbClr val="FF0000"/>
+                </a:solidFill>
+              </a:rPr>
+              <a:t>ratio between w alpha w dither and </a:t>
+            </a:r>
+            <a:r>
+              <a:rPr lang="en-US" dirty="0" smtClean="0">
+                <a:solidFill>
+                  <a:srgbClr val="FF0000"/>
+                </a:solidFill>
+              </a:rPr>
+              <a:t>w </a:t>
+            </a:r>
+            <a:r>
+              <a:rPr lang="en-US" dirty="0">
+                <a:solidFill>
+                  <a:srgbClr val="FF0000"/>
+                </a:solidFill>
+              </a:rPr>
+              <a:t>alpha wo dither</a:t>
+            </a:r>
+            <a:endParaRPr lang="en-US" dirty="0">
+              <a:solidFill>
+                <a:srgbClr val="FF0000"/>
+              </a:solidFill>
+            </a:endParaRPr>
+          </a:p>
+        </p:txBody>
+      </p:sp>
+      <p:sp>
+        <p:nvSpPr>
+          <p:cNvPr id="10" name="Rectangle 9"/>
+          <p:cNvSpPr/>
+          <p:nvPr/>
+        </p:nvSpPr>
+        <p:spPr>
+          <a:xfrm>
+            <a:off x="4184072" y="4554682"/>
+            <a:ext cx="1099725" cy="369332"/>
+          </a:xfrm>
+          <a:prstGeom prst="rect">
+            <a:avLst/>
+          </a:prstGeom>
+        </p:spPr>
+        <p:txBody>
+          <a:bodyPr wrap="none">
+            <a:spAutoFit/>
+          </a:bodyPr>
+          <a:lstStyle/>
+          <a:p>
+            <a:r>
+              <a:rPr lang="en-US" dirty="0" smtClean="0">
+                <a:solidFill>
+                  <a:srgbClr val="FF0000"/>
+                </a:solidFill>
+              </a:rPr>
+              <a:t>zoom in…</a:t>
+            </a:r>
+            <a:endParaRPr lang="en-US" dirty="0"/>
+          </a:p>
+        </p:txBody>
+      </p:sp>
+      <p:cxnSp>
+        <p:nvCxnSpPr>
+          <p:cNvPr id="12" name="Straight Arrow Connector 11"/>
+          <p:cNvCxnSpPr/>
+          <p:nvPr/>
+        </p:nvCxnSpPr>
+        <p:spPr>
+          <a:xfrm>
+            <a:off x="5369660" y="1598355"/>
+            <a:ext cx="0" cy="277000"/>
+          </a:xfrm>
+          <a:prstGeom prst="straightConnector1">
+            <a:avLst/>
+          </a:prstGeom>
+          <a:ln>
+            <a:tailEnd type="triangle"/>
+          </a:ln>
+        </p:spPr>
+        <p:style>
+          <a:lnRef idx="1">
+            <a:schemeClr val="accent1"/>
+          </a:lnRef>
+          <a:fillRef idx="0">
+            <a:schemeClr val="accent1"/>
+          </a:fillRef>
+          <a:effectRef idx="0">
+            <a:schemeClr val="accent1"/>
+          </a:effectRef>
+          <a:fontRef idx="minor">
+            <a:schemeClr val="tx1"/>
+          </a:fontRef>
+        </p:style>
+      </p:cxnSp>
+      <p:sp>
+        <p:nvSpPr>
+          <p:cNvPr id="15" name="TextBox 14"/>
+          <p:cNvSpPr txBox="1"/>
+          <p:nvPr/>
+        </p:nvSpPr>
+        <p:spPr>
+          <a:xfrm>
+            <a:off x="3345873" y="1229023"/>
+            <a:ext cx="4270464" cy="369332"/>
+          </a:xfrm>
+          <a:prstGeom prst="rect">
+            <a:avLst/>
+          </a:prstGeom>
+          <a:noFill/>
+        </p:spPr>
+        <p:txBody>
+          <a:bodyPr wrap="none" rtlCol="0">
+            <a:spAutoFit/>
+          </a:bodyPr>
+          <a:lstStyle/>
+          <a:p>
+            <a:r>
+              <a:rPr lang="en-US" dirty="0" smtClean="0">
+                <a:solidFill>
+                  <a:schemeClr val="accent1">
+                    <a:lumMod val="75000"/>
+                  </a:schemeClr>
+                </a:solidFill>
+              </a:rPr>
+              <a:t>at this alpha (0.57) we will get our best mse</a:t>
+            </a:r>
+            <a:endParaRPr lang="en-US" dirty="0">
+              <a:solidFill>
+                <a:schemeClr val="accent1">
+                  <a:lumMod val="75000"/>
+                </a:schemeClr>
+              </a:solidFill>
+            </a:endParaRPr>
+          </a:p>
+        </p:txBody>
+      </p:sp>
+      <p:cxnSp>
+        <p:nvCxnSpPr>
+          <p:cNvPr id="18" name="Straight Arrow Connector 17"/>
+          <p:cNvCxnSpPr/>
+          <p:nvPr/>
+        </p:nvCxnSpPr>
+        <p:spPr>
+          <a:xfrm>
+            <a:off x="5091545" y="4757171"/>
+            <a:ext cx="631254" cy="64211"/>
+          </a:xfrm>
+          <a:prstGeom prst="straightConnector1">
+            <a:avLst/>
+          </a:prstGeom>
+          <a:ln>
+            <a:tailEnd type="triangle"/>
+          </a:ln>
+        </p:spPr>
+        <p:style>
+          <a:lnRef idx="1">
+            <a:schemeClr val="accent2"/>
+          </a:lnRef>
+          <a:fillRef idx="0">
+            <a:schemeClr val="accent2"/>
+          </a:fillRef>
+          <a:effectRef idx="0">
+            <a:schemeClr val="accent2"/>
+          </a:effectRef>
+          <a:fontRef idx="minor">
+            <a:schemeClr val="tx1"/>
+          </a:fontRef>
+        </p:style>
+      </p:cxnSp>
     </p:spTree>
     <p:extLst>
       <p:ext uri="{BB962C8B-B14F-4D97-AF65-F5344CB8AC3E}">
-        <p14:creationId xmlns:p14="http://schemas.microsoft.com/office/powerpoint/2010/main" val="2484316590"/>
+        <p14:creationId xmlns:p14="http://schemas.microsoft.com/office/powerpoint/2010/main" val="2378995682"/>
       </p:ext>
     </p:extLst>
   </p:cSld>
@@ -3560,7 +3502,7 @@
       </p:grpSpPr>
       <p:pic>
         <p:nvPicPr>
-          <p:cNvPr id="8" name="Content Placeholder 7"/>
+          <p:cNvPr id="6" name="Content Placeholder 5"/>
           <p:cNvPicPr>
             <a:picLocks noGrp="1" noChangeAspect="1"/>
           </p:cNvPicPr>
@@ -3576,8 +3518,8 @@
         </p:blipFill>
         <p:spPr>
           <a:xfrm>
-            <a:off x="164361" y="290945"/>
-            <a:ext cx="11893004" cy="6439406"/>
+            <a:off x="245783" y="365125"/>
+            <a:ext cx="11828849" cy="6393728"/>
           </a:xfrm>
           <a:prstGeom prst="rect">
             <a:avLst/>
@@ -3601,40 +3543,93 @@
           <a:p>
             <a:r>
               <a:rPr lang="en-US" dirty="0" smtClean="0"/>
-              <a:t>bin size = 3 (without modulo)</a:t>
+              <a:t>bin size = 1.6</a:t>
             </a:r>
             <a:endParaRPr lang="en-US" dirty="0"/>
           </a:p>
         </p:txBody>
       </p:sp>
-      <p:pic>
-        <p:nvPicPr>
-          <p:cNvPr id="5" name="Picture 4"/>
-          <p:cNvPicPr>
-            <a:picLocks noChangeAspect="1"/>
-          </p:cNvPicPr>
+      <p:sp>
+        <p:nvSpPr>
+          <p:cNvPr id="3" name="Rectangle 2"/>
+          <p:cNvSpPr/>
           <p:nvPr/>
-        </p:nvPicPr>
-        <p:blipFill>
-          <a:blip r:embed="rId3"/>
-          <a:stretch>
-            <a:fillRect/>
-          </a:stretch>
-        </p:blipFill>
+        </p:nvSpPr>
         <p:spPr>
           <a:xfrm>
-            <a:off x="5756564" y="4554682"/>
-            <a:ext cx="1146896" cy="1146896"/>
+            <a:off x="3393144" y="3561989"/>
+            <a:ext cx="5459828" cy="646331"/>
           </a:xfrm>
           <a:prstGeom prst="rect">
             <a:avLst/>
           </a:prstGeom>
         </p:spPr>
-      </p:pic>
+        <p:txBody>
+          <a:bodyPr wrap="none">
+            <a:spAutoFit/>
+          </a:bodyPr>
+          <a:lstStyle/>
+          <a:p>
+            <a:r>
+              <a:rPr lang="en-US" dirty="0" smtClean="0">
+                <a:solidFill>
+                  <a:srgbClr val="FF0000"/>
+                </a:solidFill>
+              </a:rPr>
+              <a:t>1.6 is the bin size for 3 quants. so this is our worst case…</a:t>
+            </a:r>
+          </a:p>
+          <a:p>
+            <a:r>
+              <a:rPr lang="en-US" dirty="0" smtClean="0">
+                <a:solidFill>
+                  <a:srgbClr val="FF0000"/>
+                </a:solidFill>
+              </a:rPr>
+              <a:t>we can see that the ratio is very close to 1 </a:t>
+            </a:r>
+            <a:endParaRPr lang="en-US" dirty="0">
+              <a:solidFill>
+                <a:srgbClr val="FF0000"/>
+              </a:solidFill>
+            </a:endParaRPr>
+          </a:p>
+        </p:txBody>
+      </p:sp>
+      <p:sp>
+        <p:nvSpPr>
+          <p:cNvPr id="4" name="TextBox 3"/>
+          <p:cNvSpPr txBox="1"/>
+          <p:nvPr/>
+        </p:nvSpPr>
+        <p:spPr>
+          <a:xfrm>
+            <a:off x="4629662" y="5507182"/>
+            <a:ext cx="3579156" cy="646331"/>
+          </a:xfrm>
+          <a:prstGeom prst="rect">
+            <a:avLst/>
+          </a:prstGeom>
+          <a:noFill/>
+        </p:spPr>
+        <p:txBody>
+          <a:bodyPr wrap="square" rtlCol="0">
+            <a:spAutoFit/>
+          </a:bodyPr>
+          <a:lstStyle/>
+          <a:p>
+            <a:r>
+              <a:rPr lang="en-US" dirty="0" smtClean="0"/>
+              <a:t>hard to say the different between them…</a:t>
+            </a:r>
+            <a:endParaRPr lang="en-US" dirty="0"/>
+          </a:p>
+        </p:txBody>
+      </p:sp>
     </p:spTree>
     <p:extLst>
       <p:ext uri="{BB962C8B-B14F-4D97-AF65-F5344CB8AC3E}">
-        <p14:creationId xmlns:p14="http://schemas.microsoft.com/office/powerpoint/2010/main" val="2378995682"/>
+        <p14:creationId xmlns:p14="http://schemas.microsoft.com/office/powerpoint/2010/main" val="3622713123"/>
       </p:ext>
     </p:extLst>
   </p:cSld>
@@ -3663,7 +3658,7 @@
       </p:grpSpPr>
       <p:pic>
         <p:nvPicPr>
-          <p:cNvPr id="6" name="Content Placeholder 5"/>
+          <p:cNvPr id="4" name="Content Placeholder 3"/>
           <p:cNvPicPr>
             <a:picLocks noGrp="1" noChangeAspect="1"/>
           </p:cNvPicPr>
@@ -3679,8 +3674,8 @@
         </p:blipFill>
         <p:spPr>
           <a:xfrm>
-            <a:off x="245783" y="365125"/>
-            <a:ext cx="11828849" cy="6393728"/>
+            <a:off x="198507" y="259773"/>
+            <a:ext cx="11836559" cy="6478299"/>
           </a:xfrm>
           <a:prstGeom prst="rect">
             <a:avLst/>
@@ -3704,7 +3699,7 @@
           <a:p>
             <a:r>
               <a:rPr lang="en-US" dirty="0" smtClean="0"/>
-              <a:t>bin size = 1.6</a:t>
+              <a:t>bin size = 0.5</a:t>
             </a:r>
             <a:endParaRPr lang="en-US" dirty="0"/>
           </a:p>
@@ -3713,7 +3708,7 @@
     </p:spTree>
     <p:extLst>
       <p:ext uri="{BB962C8B-B14F-4D97-AF65-F5344CB8AC3E}">
-        <p14:creationId xmlns:p14="http://schemas.microsoft.com/office/powerpoint/2010/main" val="3622713123"/>
+        <p14:creationId xmlns:p14="http://schemas.microsoft.com/office/powerpoint/2010/main" val="981802110"/>
       </p:ext>
     </p:extLst>
   </p:cSld>
@@ -3740,32 +3735,6 @@
           <a:chExt cx="0" cy="0"/>
         </a:xfrm>
       </p:grpSpPr>
-      <p:pic>
-        <p:nvPicPr>
-          <p:cNvPr id="4" name="Content Placeholder 3"/>
-          <p:cNvPicPr>
-            <a:picLocks noGrp="1" noChangeAspect="1"/>
-          </p:cNvPicPr>
-          <p:nvPr>
-            <p:ph idx="1"/>
-          </p:nvPr>
-        </p:nvPicPr>
-        <p:blipFill>
-          <a:blip r:embed="rId2"/>
-          <a:stretch>
-            <a:fillRect/>
-          </a:stretch>
-        </p:blipFill>
-        <p:spPr>
-          <a:xfrm>
-            <a:off x="198507" y="259773"/>
-            <a:ext cx="11836559" cy="6478299"/>
-          </a:xfrm>
-          <a:prstGeom prst="rect">
-            <a:avLst/>
-          </a:prstGeom>
-        </p:spPr>
-      </p:pic>
       <p:sp>
         <p:nvSpPr>
           <p:cNvPr id="2" name="Title 1"/>
@@ -3783,16 +3752,377 @@
           <a:p>
             <a:r>
               <a:rPr lang="en-US" dirty="0" smtClean="0"/>
-              <a:t>bin size = 0.5</a:t>
+              <a:t>best bin sizes per number of quantizer for data var = 1 (with modulo)</a:t>
             </a:r>
             <a:endParaRPr lang="en-US" dirty="0"/>
+          </a:p>
+        </p:txBody>
+      </p:sp>
+      <p:sp>
+        <p:nvSpPr>
+          <p:cNvPr id="3" name="Content Placeholder 2"/>
+          <p:cNvSpPr>
+            <a:spLocks noGrp="1"/>
+          </p:cNvSpPr>
+          <p:nvPr>
+            <p:ph idx="1"/>
+          </p:nvPr>
+        </p:nvSpPr>
+        <p:spPr/>
+        <p:txBody>
+          <a:bodyPr numCol="3">
+            <a:noAutofit/>
+          </a:bodyPr>
+          <a:lstStyle/>
+          <a:p>
+            <a:pPr marL="0" indent="0">
+              <a:buNone/>
+            </a:pPr>
+            <a:r>
+              <a:rPr lang="en-US" sz="1800" dirty="0" smtClean="0"/>
+              <a:t> 3</a:t>
+            </a:r>
+            <a:r>
+              <a:rPr lang="en-US" sz="1800" dirty="0"/>
+              <a:t>: 1.6400000000000015,</a:t>
+            </a:r>
+          </a:p>
+          <a:p>
+            <a:pPr marL="0" indent="0">
+              <a:buNone/>
+            </a:pPr>
+            <a:r>
+              <a:rPr lang="en-US" sz="1800" dirty="0"/>
+              <a:t> 4: 1.342000000000001,</a:t>
+            </a:r>
+          </a:p>
+          <a:p>
+            <a:pPr marL="0" indent="0">
+              <a:buNone/>
+            </a:pPr>
+            <a:r>
+              <a:rPr lang="en-US" sz="1800" dirty="0"/>
+              <a:t> 5: 1.1866666666666676,</a:t>
+            </a:r>
+          </a:p>
+          <a:p>
+            <a:pPr marL="0" indent="0">
+              <a:buNone/>
+            </a:pPr>
+            <a:r>
+              <a:rPr lang="en-US" sz="1800" dirty="0"/>
+              <a:t> 6: 1.0021428571428579,</a:t>
+            </a:r>
+          </a:p>
+          <a:p>
+            <a:pPr marL="0" indent="0">
+              <a:buNone/>
+            </a:pPr>
+            <a:r>
+              <a:rPr lang="en-US" sz="1800" dirty="0"/>
+              <a:t> 7: 0.91375000000000073,</a:t>
+            </a:r>
+          </a:p>
+          <a:p>
+            <a:pPr marL="0" indent="0">
+              <a:buNone/>
+            </a:pPr>
+            <a:r>
+              <a:rPr lang="en-US" sz="1800" dirty="0"/>
+              <a:t> 8: 0.83888888888888946,</a:t>
+            </a:r>
+          </a:p>
+          <a:p>
+            <a:pPr marL="0" indent="0">
+              <a:buNone/>
+            </a:pPr>
+            <a:r>
+              <a:rPr lang="en-US" sz="1800" dirty="0"/>
+              <a:t> 9: 0.75650000000000084,</a:t>
+            </a:r>
+          </a:p>
+          <a:p>
+            <a:pPr marL="0" indent="0">
+              <a:buNone/>
+            </a:pPr>
+            <a:r>
+              <a:rPr lang="en-US" sz="1800" dirty="0"/>
+              <a:t> 10: 0.66045454545454607,</a:t>
+            </a:r>
+          </a:p>
+          <a:p>
+            <a:pPr marL="0" indent="0">
+              <a:buNone/>
+            </a:pPr>
+            <a:r>
+              <a:rPr lang="en-US" sz="1800" dirty="0"/>
+              <a:t> 11: 0.63333333333333375,</a:t>
+            </a:r>
+          </a:p>
+          <a:p>
+            <a:pPr marL="0" indent="0">
+              <a:buNone/>
+            </a:pPr>
+            <a:r>
+              <a:rPr lang="en-US" sz="1800" dirty="0"/>
+              <a:t> 12: 0.57346153846153891,</a:t>
+            </a:r>
+          </a:p>
+          <a:p>
+            <a:pPr marL="0" indent="0">
+              <a:buNone/>
+            </a:pPr>
+            <a:r>
+              <a:rPr lang="en-US" sz="1800" dirty="0"/>
+              <a:t> 13: 0.53500000000000059,</a:t>
+            </a:r>
+          </a:p>
+          <a:p>
+            <a:pPr marL="0" indent="0">
+              <a:buNone/>
+            </a:pPr>
+            <a:r>
+              <a:rPr lang="en-US" sz="1800" dirty="0"/>
+              <a:t> 14: 0.51066666666666682,</a:t>
+            </a:r>
+          </a:p>
+          <a:p>
+            <a:pPr marL="0" indent="0">
+              <a:buNone/>
+            </a:pPr>
+            <a:r>
+              <a:rPr lang="en-US" sz="1800" dirty="0"/>
+              <a:t> 15: 0.48218750000000021,</a:t>
+            </a:r>
+          </a:p>
+          <a:p>
+            <a:pPr marL="0" indent="0">
+              <a:buNone/>
+            </a:pPr>
+            <a:r>
+              <a:rPr lang="en-US" sz="1800" dirty="0"/>
+              <a:t> 16: 0.4529411764705884,</a:t>
+            </a:r>
+          </a:p>
+          <a:p>
+            <a:pPr marL="0" indent="0">
+              <a:buNone/>
+            </a:pPr>
+            <a:r>
+              <a:rPr lang="en-US" sz="1800" dirty="0"/>
+              <a:t> 17: 0.43416666666666703,</a:t>
+            </a:r>
+          </a:p>
+          <a:p>
+            <a:pPr marL="0" indent="0">
+              <a:buNone/>
+            </a:pPr>
+            <a:r>
+              <a:rPr lang="en-US" sz="1800" dirty="0"/>
+              <a:t> 18: 0.41526315789473722,</a:t>
+            </a:r>
+          </a:p>
+          <a:p>
+            <a:pPr marL="0" indent="0">
+              <a:buNone/>
+            </a:pPr>
+            <a:r>
+              <a:rPr lang="en-US" sz="1800" dirty="0"/>
+              <a:t> 19: 0.38925000000000054,</a:t>
+            </a:r>
+          </a:p>
+          <a:p>
+            <a:pPr marL="0" indent="0">
+              <a:buNone/>
+            </a:pPr>
+            <a:r>
+              <a:rPr lang="en-US" sz="1800" dirty="0"/>
+              <a:t> 20: 0.36142857142857165,</a:t>
+            </a:r>
+          </a:p>
+          <a:p>
+            <a:pPr marL="0" indent="0">
+              <a:buNone/>
+            </a:pPr>
+            <a:r>
+              <a:rPr lang="en-US" sz="1800" dirty="0"/>
+              <a:t> 21: 0.36818181818181861,</a:t>
+            </a:r>
+          </a:p>
+          <a:p>
+            <a:pPr marL="0" indent="0">
+              <a:buNone/>
+            </a:pPr>
+            <a:r>
+              <a:rPr lang="en-US" sz="1800" dirty="0"/>
+              <a:t> 22: 0.34456521739130475,</a:t>
+            </a:r>
+          </a:p>
+          <a:p>
+            <a:pPr marL="0" indent="0">
+              <a:buNone/>
+            </a:pPr>
+            <a:r>
+              <a:rPr lang="en-US" sz="1800" dirty="0"/>
+              <a:t> 23: 0.3266666666666671,</a:t>
+            </a:r>
+          </a:p>
+          <a:p>
+            <a:pPr marL="0" indent="0">
+              <a:buNone/>
+            </a:pPr>
+            <a:r>
+              <a:rPr lang="en-US" sz="1800" dirty="0"/>
+              <a:t> 24: 0.31840000000000046,</a:t>
+            </a:r>
+          </a:p>
+          <a:p>
+            <a:pPr marL="0" indent="0">
+              <a:buNone/>
+            </a:pPr>
+            <a:r>
+              <a:rPr lang="en-US" sz="1800" dirty="0"/>
+              <a:t> 25: 0.30692307692307708,</a:t>
+            </a:r>
+          </a:p>
+          <a:p>
+            <a:pPr marL="0" indent="0">
+              <a:buNone/>
+            </a:pPr>
+            <a:r>
+              <a:rPr lang="en-US" sz="1800" dirty="0"/>
+              <a:t> 26: 0.28555555555555578,</a:t>
+            </a:r>
+          </a:p>
+          <a:p>
+            <a:pPr marL="0" indent="0">
+              <a:buNone/>
+            </a:pPr>
+            <a:r>
+              <a:rPr lang="en-US" sz="1800" dirty="0"/>
+              <a:t> 27: 0.28392857142857153,</a:t>
+            </a:r>
+          </a:p>
+          <a:p>
+            <a:pPr marL="0" indent="0">
+              <a:buNone/>
+            </a:pPr>
+            <a:r>
+              <a:rPr lang="en-US" sz="1800" dirty="0"/>
+              <a:t> 28: 0.27741379310344838,</a:t>
+            </a:r>
+          </a:p>
+          <a:p>
+            <a:pPr marL="0" indent="0">
+              <a:buNone/>
+            </a:pPr>
+            <a:r>
+              <a:rPr lang="en-US" sz="1800" dirty="0"/>
+              <a:t> 29: 0.26583333333333359,</a:t>
+            </a:r>
+          </a:p>
+          <a:p>
+            <a:pPr marL="0" indent="0">
+              <a:buNone/>
+            </a:pPr>
+            <a:r>
+              <a:rPr lang="en-US" sz="1800" dirty="0"/>
+              <a:t> 30: 0.25983870967741973,</a:t>
+            </a:r>
+          </a:p>
+          <a:p>
+            <a:pPr marL="0" indent="0">
+              <a:buNone/>
+            </a:pPr>
+            <a:r>
+              <a:rPr lang="en-US" sz="1800" dirty="0"/>
+              <a:t> 31: 0.24562500000000043,</a:t>
+            </a:r>
+          </a:p>
+          <a:p>
+            <a:pPr marL="0" indent="0">
+              <a:buNone/>
+            </a:pPr>
+            <a:r>
+              <a:rPr lang="en-US" sz="1800" dirty="0"/>
+              <a:t> 32: 0.2360606060606063,</a:t>
+            </a:r>
+          </a:p>
+          <a:p>
+            <a:pPr marL="0" indent="0">
+              <a:buNone/>
+            </a:pPr>
+            <a:r>
+              <a:rPr lang="en-US" sz="1800" dirty="0"/>
+              <a:t> 33: 0.23573529411764715,</a:t>
+            </a:r>
+          </a:p>
+          <a:p>
+            <a:pPr marL="0" indent="0">
+              <a:buNone/>
+            </a:pPr>
+            <a:r>
+              <a:rPr lang="en-US" sz="1800" dirty="0"/>
+              <a:t> 34: 0.21785714285714297,</a:t>
+            </a:r>
+          </a:p>
+          <a:p>
+            <a:pPr marL="0" indent="0">
+              <a:buNone/>
+            </a:pPr>
+            <a:r>
+              <a:rPr lang="en-US" sz="1800" dirty="0"/>
+              <a:t> 35: 0.22208333333333341,</a:t>
+            </a:r>
+          </a:p>
+          <a:p>
+            <a:pPr marL="0" indent="0">
+              <a:buNone/>
+            </a:pPr>
+            <a:r>
+              <a:rPr lang="en-US" sz="1800" dirty="0"/>
+              <a:t> 36: 0.21310810810810832,</a:t>
+            </a:r>
+          </a:p>
+          <a:p>
+            <a:pPr marL="0" indent="0">
+              <a:buNone/>
+            </a:pPr>
+            <a:r>
+              <a:rPr lang="en-US" sz="1800" dirty="0"/>
+              <a:t> 37: 0.21381578947368451,</a:t>
+            </a:r>
+          </a:p>
+          <a:p>
+            <a:pPr marL="0" indent="0">
+              <a:buNone/>
+            </a:pPr>
+            <a:r>
+              <a:rPr lang="en-US" sz="1800" dirty="0"/>
+              <a:t> 38: 0.20243589743589752,</a:t>
+            </a:r>
+          </a:p>
+          <a:p>
+            <a:pPr marL="0" indent="0">
+              <a:buNone/>
+            </a:pPr>
+            <a:r>
+              <a:rPr lang="en-US" sz="1800" dirty="0"/>
+              <a:t> 39: 0.18800000000000017</a:t>
+            </a:r>
+          </a:p>
+          <a:p>
+            <a:pPr marL="0" indent="0">
+              <a:buNone/>
+            </a:pPr>
+            <a:endParaRPr lang="en-US" sz="1800" dirty="0"/>
           </a:p>
         </p:txBody>
       </p:sp>
     </p:spTree>
     <p:extLst>
       <p:ext uri="{BB962C8B-B14F-4D97-AF65-F5344CB8AC3E}">
-        <p14:creationId xmlns:p14="http://schemas.microsoft.com/office/powerpoint/2010/main" val="981802110"/>
+        <p14:creationId xmlns:p14="http://schemas.microsoft.com/office/powerpoint/2010/main" val="2484316590"/>
       </p:ext>
     </p:extLst>
   </p:cSld>

</xml_diff>